<commit_message>
added jupyter code slide
</commit_message>
<xml_diff>
--- a/Retail Landscape by State.pptx
+++ b/Retail Landscape by State.pptx
@@ -18,8 +18,9 @@
     <p:sldId id="273" r:id="rId12"/>
     <p:sldId id="271" r:id="rId13"/>
     <p:sldId id="272" r:id="rId14"/>
-    <p:sldId id="268" r:id="rId15"/>
-    <p:sldId id="264" r:id="rId16"/>
+    <p:sldId id="274" r:id="rId15"/>
+    <p:sldId id="268" r:id="rId16"/>
+    <p:sldId id="264" r:id="rId17"/>
   </p:sldIdLst>
   <p:sldSz cx="12192000" cy="6858000"/>
   <p:notesSz cx="6858000" cy="9144000"/>
@@ -10297,7 +10298,7 @@
             </a:spcAft>
             <a:buNone/>
           </a:pPr>
-          <a:endParaRPr lang="en-US" sz="2200" kern="1200"/>
+          <a:endParaRPr lang="en-US" sz="2200" kern="1200" dirty="0"/>
         </a:p>
       </dsp:txBody>
       <dsp:txXfrm rot="5400000">
@@ -29599,6 +29600,97 @@
           <a:p>
             <a:pPr algn="ctr"/>
             <a:r>
+              <a:rPr lang="en-US" dirty="0" err="1"/>
+              <a:t>Jupyter</a:t>
+            </a:r>
+            <a:r>
+              <a:rPr lang="en-US" dirty="0"/>
+              <a:t> Notebook</a:t>
+            </a:r>
+          </a:p>
+        </p:txBody>
+      </p:sp>
+      <p:pic>
+        <p:nvPicPr>
+          <p:cNvPr id="5" name="Content Placeholder 4">
+            <a:extLst>
+              <a:ext uri="{FF2B5EF4-FFF2-40B4-BE49-F238E27FC236}">
+                <a16:creationId xmlns:a16="http://schemas.microsoft.com/office/drawing/2014/main" id="{76AD4ADA-1F8F-406E-AA80-C6E61C7B7277}"/>
+              </a:ext>
+            </a:extLst>
+          </p:cNvPr>
+          <p:cNvPicPr>
+            <a:picLocks noGrp="1" noChangeAspect="1"/>
+          </p:cNvPicPr>
+          <p:nvPr>
+            <p:ph idx="1"/>
+          </p:nvPr>
+        </p:nvPicPr>
+        <p:blipFill rotWithShape="1">
+          <a:blip r:embed="rId2"/>
+          <a:srcRect r="67639"/>
+          <a:stretch/>
+        </p:blipFill>
+        <p:spPr>
+          <a:xfrm>
+            <a:off x="3712218" y="856735"/>
+            <a:ext cx="7847780" cy="4959179"/>
+          </a:xfrm>
+        </p:spPr>
+      </p:pic>
+    </p:spTree>
+    <p:extLst>
+      <p:ext uri="{BB962C8B-B14F-4D97-AF65-F5344CB8AC3E}">
+        <p14:creationId xmlns:p14="http://schemas.microsoft.com/office/powerpoint/2010/main" val="1906126464"/>
+      </p:ext>
+    </p:extLst>
+  </p:cSld>
+  <p:clrMapOvr>
+    <a:masterClrMapping/>
+  </p:clrMapOvr>
+</p:sld>
+</file>
+
+<file path=ppt/slides/slide15.xml><?xml version="1.0" encoding="utf-8"?>
+<p:sld xmlns:a="http://schemas.openxmlformats.org/drawingml/2006/main" xmlns:r="http://schemas.openxmlformats.org/officeDocument/2006/relationships" xmlns:p="http://schemas.openxmlformats.org/presentationml/2006/main">
+  <p:cSld>
+    <p:spTree>
+      <p:nvGrpSpPr>
+        <p:cNvPr id="1" name=""/>
+        <p:cNvGrpSpPr/>
+        <p:nvPr/>
+      </p:nvGrpSpPr>
+      <p:grpSpPr>
+        <a:xfrm>
+          <a:off x="0" y="0"/>
+          <a:ext cx="0" cy="0"/>
+          <a:chOff x="0" y="0"/>
+          <a:chExt cx="0" cy="0"/>
+        </a:xfrm>
+      </p:grpSpPr>
+      <p:sp>
+        <p:nvSpPr>
+          <p:cNvPr id="2" name="Title 1">
+            <a:extLst>
+              <a:ext uri="{FF2B5EF4-FFF2-40B4-BE49-F238E27FC236}">
+                <a16:creationId xmlns:a16="http://schemas.microsoft.com/office/drawing/2014/main" id="{B31529F1-5ACC-4B1D-BE32-C5305BD7FB29}"/>
+              </a:ext>
+            </a:extLst>
+          </p:cNvPr>
+          <p:cNvSpPr>
+            <a:spLocks noGrp="1"/>
+          </p:cNvSpPr>
+          <p:nvPr>
+            <p:ph type="title"/>
+          </p:nvPr>
+        </p:nvSpPr>
+        <p:spPr/>
+        <p:txBody>
+          <a:bodyPr/>
+          <a:lstStyle/>
+          <a:p>
+            <a:pPr algn="ctr"/>
+            <a:r>
               <a:rPr lang="en-US" dirty="0"/>
               <a:t>Outliers</a:t>
             </a:r>
@@ -29643,7 +29735,7 @@
 </p:sld>
 </file>
 
-<file path=ppt/slides/slide15.xml><?xml version="1.0" encoding="utf-8"?>
+<file path=ppt/slides/slide16.xml><?xml version="1.0" encoding="utf-8"?>
 <p:sld xmlns:a="http://schemas.openxmlformats.org/drawingml/2006/main" xmlns:r="http://schemas.openxmlformats.org/officeDocument/2006/relationships" xmlns:p="http://schemas.openxmlformats.org/presentationml/2006/main">
   <p:cSld>
     <p:spTree>

</xml_diff>